<commit_message>
ALL FROM DATABASES + EXAM + LITLE FROM ASP.NET
</commit_message>
<xml_diff>
--- a/DataBases/Presentations/1. Database-Transactions-Basic-Concepts.pptx
+++ b/DataBases/Presentations/1. Database-Transactions-Basic-Concepts.pptx
@@ -275,6 +275,36 @@
       </a:defRPr>
     </a:lvl9pPr>
   </p:defaultTextStyle>
+  <p:extLst>
+    <p:ext uri="{EFAFB233-063F-42B5-8137-9DF3F51BA10A}">
+      <p15:sldGuideLst xmlns:p15="http://schemas.microsoft.com/office/powerpoint/2012/main">
+        <p15:guide id="1" orient="horz" pos="2160">
+          <p15:clr>
+            <a:srgbClr val="A4A3A4"/>
+          </p15:clr>
+        </p15:guide>
+        <p15:guide id="2" pos="2880">
+          <p15:clr>
+            <a:srgbClr val="A4A3A4"/>
+          </p15:clr>
+        </p15:guide>
+      </p15:sldGuideLst>
+    </p:ext>
+    <p:ext uri="{2D200454-40CA-4A62-9FC3-DE9A4176ACB9}">
+      <p15:notesGuideLst xmlns:p15="http://schemas.microsoft.com/office/powerpoint/2012/main">
+        <p15:guide id="1" orient="horz" pos="3126">
+          <p15:clr>
+            <a:srgbClr val="A4A3A4"/>
+          </p15:clr>
+        </p15:guide>
+        <p15:guide id="2" pos="2101">
+          <p15:clr>
+            <a:srgbClr val="A4A3A4"/>
+          </p15:clr>
+        </p15:guide>
+      </p15:notesGuideLst>
+    </p:ext>
+  </p:extLst>
 </p:presentation>
 </file>
 
@@ -454,7 +484,7 @@
             <a:fld id="{FEA767D5-DE47-4989-A0A5-C3AE0DF1E420}" type="datetime1">
               <a:rPr lang="en-US"/>
               <a:pPr/>
-              <a:t>29.07.2012</a:t>
+              <a:t>17.07.2013</a:t>
             </a:fld>
             <a:endParaRPr lang="bg-BG"/>
           </a:p>
@@ -811,7 +841,7 @@
             <a:fld id="{594C6D40-BCC7-428A-B2A2-A9BEDD2F1EB0}" type="datetime1">
               <a:rPr lang="en-US"/>
               <a:pPr/>
-              <a:t>29.07.2012</a:t>
+              <a:t>17.07.2013</a:t>
             </a:fld>
             <a:r>
               <a:rPr lang="en-US"/>
@@ -1319,7 +1349,7 @@
             <a:fld id="{1E07A9EA-719F-40E4-87DF-FBE21889DED6}" type="datetime1">
               <a:rPr lang="en-US"/>
               <a:pPr/>
-              <a:t>29.07.2012</a:t>
+              <a:t>17.07.2013</a:t>
             </a:fld>
             <a:r>
               <a:rPr lang="en-US"/>
@@ -1418,6 +1448,11 @@
         </p:txBody>
       </p:sp>
     </p:spTree>
+    <p:extLst>
+      <p:ext uri="{BB962C8B-B14F-4D97-AF65-F5344CB8AC3E}">
+        <p14:creationId xmlns:p14="http://schemas.microsoft.com/office/powerpoint/2010/main" val="3525862585"/>
+      </p:ext>
+    </p:extLst>
   </p:cSld>
   <p:clrMapOvr>
     <a:masterClrMapping/>
@@ -1487,7 +1522,7 @@
             <a:fld id="{390D5A23-BDC6-479A-9F29-85C3B3C86C50}" type="datetime1">
               <a:rPr lang="en-US"/>
               <a:pPr/>
-              <a:t>29.07.2012</a:t>
+              <a:t>17.07.2013</a:t>
             </a:fld>
             <a:r>
               <a:rPr lang="en-US"/>
@@ -1586,6 +1621,11 @@
         </p:txBody>
       </p:sp>
     </p:spTree>
+    <p:extLst>
+      <p:ext uri="{BB962C8B-B14F-4D97-AF65-F5344CB8AC3E}">
+        <p14:creationId xmlns:p14="http://schemas.microsoft.com/office/powerpoint/2010/main" val="2974826609"/>
+      </p:ext>
+    </p:extLst>
   </p:cSld>
   <p:clrMapOvr>
     <a:masterClrMapping/>
@@ -1655,7 +1695,7 @@
             <a:fld id="{BBF128D0-00EA-423A-B65B-28905F0E276F}" type="datetime1">
               <a:rPr lang="en-US"/>
               <a:pPr/>
-              <a:t>29.07.2012</a:t>
+              <a:t>17.07.2013</a:t>
             </a:fld>
             <a:r>
               <a:rPr lang="en-US"/>
@@ -1754,6 +1794,11 @@
         </p:txBody>
       </p:sp>
     </p:spTree>
+    <p:extLst>
+      <p:ext uri="{BB962C8B-B14F-4D97-AF65-F5344CB8AC3E}">
+        <p14:creationId xmlns:p14="http://schemas.microsoft.com/office/powerpoint/2010/main" val="482143734"/>
+      </p:ext>
+    </p:extLst>
   </p:cSld>
   <p:clrMapOvr>
     <a:masterClrMapping/>
@@ -1823,7 +1868,7 @@
             <a:fld id="{BA7ADD2D-1ECF-4378-B02D-6532B7D7A89E}" type="datetime1">
               <a:rPr lang="en-US"/>
               <a:pPr/>
-              <a:t>29.07.2012</a:t>
+              <a:t>17.07.2013</a:t>
             </a:fld>
             <a:r>
               <a:rPr lang="en-US"/>
@@ -1922,6 +1967,11 @@
         </p:txBody>
       </p:sp>
     </p:spTree>
+    <p:extLst>
+      <p:ext uri="{BB962C8B-B14F-4D97-AF65-F5344CB8AC3E}">
+        <p14:creationId xmlns:p14="http://schemas.microsoft.com/office/powerpoint/2010/main" val="2893410124"/>
+      </p:ext>
+    </p:extLst>
   </p:cSld>
   <p:clrMapOvr>
     <a:masterClrMapping/>
@@ -1991,7 +2041,7 @@
             <a:fld id="{DAE9FD36-D8B3-4EAD-B775-4F71321FF711}" type="datetime1">
               <a:rPr lang="en-US"/>
               <a:pPr/>
-              <a:t>29.07.2012</a:t>
+              <a:t>17.07.2013</a:t>
             </a:fld>
             <a:r>
               <a:rPr lang="en-US"/>
@@ -2090,6 +2140,11 @@
         </p:txBody>
       </p:sp>
     </p:spTree>
+    <p:extLst>
+      <p:ext uri="{BB962C8B-B14F-4D97-AF65-F5344CB8AC3E}">
+        <p14:creationId xmlns:p14="http://schemas.microsoft.com/office/powerpoint/2010/main" val="616249621"/>
+      </p:ext>
+    </p:extLst>
   </p:cSld>
   <p:clrMapOvr>
     <a:masterClrMapping/>
@@ -2159,7 +2214,7 @@
             <a:fld id="{703446A4-07C4-4203-BF6C-49363486763F}" type="datetime1">
               <a:rPr lang="en-US"/>
               <a:pPr/>
-              <a:t>29.07.2012</a:t>
+              <a:t>17.07.2013</a:t>
             </a:fld>
             <a:r>
               <a:rPr lang="en-US"/>
@@ -2258,6 +2313,11 @@
         </p:txBody>
       </p:sp>
     </p:spTree>
+    <p:extLst>
+      <p:ext uri="{BB962C8B-B14F-4D97-AF65-F5344CB8AC3E}">
+        <p14:creationId xmlns:p14="http://schemas.microsoft.com/office/powerpoint/2010/main" val="3123968913"/>
+      </p:ext>
+    </p:extLst>
   </p:cSld>
   <p:clrMapOvr>
     <a:masterClrMapping/>
@@ -2327,7 +2387,7 @@
             <a:fld id="{82B6242F-12C4-48F0-B24F-AA01A3A56A54}" type="datetime1">
               <a:rPr lang="en-US"/>
               <a:pPr/>
-              <a:t>29.07.2012</a:t>
+              <a:t>17.07.2013</a:t>
             </a:fld>
             <a:r>
               <a:rPr lang="en-US"/>
@@ -2426,6 +2486,11 @@
         </p:txBody>
       </p:sp>
     </p:spTree>
+    <p:extLst>
+      <p:ext uri="{BB962C8B-B14F-4D97-AF65-F5344CB8AC3E}">
+        <p14:creationId xmlns:p14="http://schemas.microsoft.com/office/powerpoint/2010/main" val="20682541"/>
+      </p:ext>
+    </p:extLst>
   </p:cSld>
   <p:clrMapOvr>
     <a:masterClrMapping/>
@@ -2495,7 +2560,7 @@
             <a:fld id="{813060A1-AA0D-47D9-A40C-407F9721861D}" type="datetime1">
               <a:rPr lang="en-US"/>
               <a:pPr/>
-              <a:t>29.07.2012</a:t>
+              <a:t>17.07.2013</a:t>
             </a:fld>
             <a:r>
               <a:rPr lang="en-US"/>
@@ -2594,6 +2659,11 @@
         </p:txBody>
       </p:sp>
     </p:spTree>
+    <p:extLst>
+      <p:ext uri="{BB962C8B-B14F-4D97-AF65-F5344CB8AC3E}">
+        <p14:creationId xmlns:p14="http://schemas.microsoft.com/office/powerpoint/2010/main" val="292289553"/>
+      </p:ext>
+    </p:extLst>
   </p:cSld>
   <p:clrMapOvr>
     <a:masterClrMapping/>
@@ -2663,7 +2733,7 @@
             <a:fld id="{9EEFCE21-A9E8-4B8F-9B51-AC6F13C55895}" type="datetime1">
               <a:rPr lang="en-US"/>
               <a:pPr/>
-              <a:t>29.07.2012</a:t>
+              <a:t>17.07.2013</a:t>
             </a:fld>
             <a:r>
               <a:rPr lang="en-US"/>
@@ -2762,6 +2832,11 @@
         </p:txBody>
       </p:sp>
     </p:spTree>
+    <p:extLst>
+      <p:ext uri="{BB962C8B-B14F-4D97-AF65-F5344CB8AC3E}">
+        <p14:creationId xmlns:p14="http://schemas.microsoft.com/office/powerpoint/2010/main" val="4016214768"/>
+      </p:ext>
+    </p:extLst>
   </p:cSld>
   <p:clrMapOvr>
     <a:masterClrMapping/>
@@ -2831,7 +2906,7 @@
             <a:fld id="{193EAC13-9EE5-4C24-B6B7-22061CA6FF9A}" type="datetime1">
               <a:rPr lang="en-US"/>
               <a:pPr/>
-              <a:t>29.07.2012</a:t>
+              <a:t>17.07.2013</a:t>
             </a:fld>
             <a:r>
               <a:rPr lang="en-US"/>
@@ -2930,6 +3005,11 @@
         </p:txBody>
       </p:sp>
     </p:spTree>
+    <p:extLst>
+      <p:ext uri="{BB962C8B-B14F-4D97-AF65-F5344CB8AC3E}">
+        <p14:creationId xmlns:p14="http://schemas.microsoft.com/office/powerpoint/2010/main" val="2548277649"/>
+      </p:ext>
+    </p:extLst>
   </p:cSld>
   <p:clrMapOvr>
     <a:masterClrMapping/>
@@ -2999,7 +3079,7 @@
             <a:fld id="{21BC9943-D2D1-4666-AD26-4A50696FF73F}" type="datetime1">
               <a:rPr lang="en-US"/>
               <a:pPr/>
-              <a:t>29.07.2012</a:t>
+              <a:t>17.07.2013</a:t>
             </a:fld>
             <a:r>
               <a:rPr lang="en-US"/>
@@ -3098,6 +3178,11 @@
         </p:txBody>
       </p:sp>
     </p:spTree>
+    <p:extLst>
+      <p:ext uri="{BB962C8B-B14F-4D97-AF65-F5344CB8AC3E}">
+        <p14:creationId xmlns:p14="http://schemas.microsoft.com/office/powerpoint/2010/main" val="97932681"/>
+      </p:ext>
+    </p:extLst>
   </p:cSld>
   <p:clrMapOvr>
     <a:masterClrMapping/>
@@ -3167,7 +3252,7 @@
             <a:fld id="{9B7829E0-F923-4198-B3E5-4DD2525C58C8}" type="datetime1">
               <a:rPr lang="en-US"/>
               <a:pPr/>
-              <a:t>29.07.2012</a:t>
+              <a:t>17.07.2013</a:t>
             </a:fld>
             <a:r>
               <a:rPr lang="en-US"/>
@@ -3277,6 +3362,11 @@
         </p:txBody>
       </p:sp>
     </p:spTree>
+    <p:extLst>
+      <p:ext uri="{BB962C8B-B14F-4D97-AF65-F5344CB8AC3E}">
+        <p14:creationId xmlns:p14="http://schemas.microsoft.com/office/powerpoint/2010/main" val="1062875594"/>
+      </p:ext>
+    </p:extLst>
   </p:cSld>
   <p:clrMapOvr>
     <a:masterClrMapping/>
@@ -3346,7 +3436,7 @@
             <a:fld id="{D1FEFC3D-CE88-4DCB-9313-824DC58874F2}" type="datetime1">
               <a:rPr lang="en-US"/>
               <a:pPr/>
-              <a:t>29.07.2012</a:t>
+              <a:t>17.07.2013</a:t>
             </a:fld>
             <a:r>
               <a:rPr lang="en-US"/>
@@ -3742,6 +3832,11 @@
         </p:txBody>
       </p:sp>
     </p:spTree>
+    <p:extLst>
+      <p:ext uri="{BB962C8B-B14F-4D97-AF65-F5344CB8AC3E}">
+        <p14:creationId xmlns:p14="http://schemas.microsoft.com/office/powerpoint/2010/main" val="2011271789"/>
+      </p:ext>
+    </p:extLst>
   </p:cSld>
   <p:clrMapOvr>
     <a:masterClrMapping/>
@@ -3811,7 +3906,7 @@
             <a:fld id="{A42F99AD-94F2-4D11-8016-4EDCBAA89D2A}" type="datetime1">
               <a:rPr lang="en-US"/>
               <a:pPr/>
-              <a:t>29.07.2012</a:t>
+              <a:t>17.07.2013</a:t>
             </a:fld>
             <a:r>
               <a:rPr lang="en-US"/>
@@ -3923,6 +4018,11 @@
         </p:txBody>
       </p:sp>
     </p:spTree>
+    <p:extLst>
+      <p:ext uri="{BB962C8B-B14F-4D97-AF65-F5344CB8AC3E}">
+        <p14:creationId xmlns:p14="http://schemas.microsoft.com/office/powerpoint/2010/main" val="2648951347"/>
+      </p:ext>
+    </p:extLst>
   </p:cSld>
   <p:clrMapOvr>
     <a:masterClrMapping/>
@@ -3992,7 +4092,7 @@
             <a:fld id="{C47334C5-10C5-49C2-AAC6-B978962D0615}" type="datetime1">
               <a:rPr lang="en-US"/>
               <a:pPr/>
-              <a:t>29.07.2012</a:t>
+              <a:t>17.07.2013</a:t>
             </a:fld>
             <a:r>
               <a:rPr lang="en-US"/>
@@ -4091,6 +4191,11 @@
         </p:txBody>
       </p:sp>
     </p:spTree>
+    <p:extLst>
+      <p:ext uri="{BB962C8B-B14F-4D97-AF65-F5344CB8AC3E}">
+        <p14:creationId xmlns:p14="http://schemas.microsoft.com/office/powerpoint/2010/main" val="3589018172"/>
+      </p:ext>
+    </p:extLst>
   </p:cSld>
   <p:clrMapOvr>
     <a:masterClrMapping/>
@@ -4160,7 +4265,7 @@
             <a:fld id="{9533C226-D8F3-4312-BD08-7DAECD92C6FF}" type="datetime1">
               <a:rPr lang="en-US"/>
               <a:pPr/>
-              <a:t>29.07.2012</a:t>
+              <a:t>17.07.2013</a:t>
             </a:fld>
             <a:r>
               <a:rPr lang="en-US"/>
@@ -4259,6 +4364,11 @@
         </p:txBody>
       </p:sp>
     </p:spTree>
+    <p:extLst>
+      <p:ext uri="{BB962C8B-B14F-4D97-AF65-F5344CB8AC3E}">
+        <p14:creationId xmlns:p14="http://schemas.microsoft.com/office/powerpoint/2010/main" val="1978838438"/>
+      </p:ext>
+    </p:extLst>
   </p:cSld>
   <p:clrMapOvr>
     <a:masterClrMapping/>
@@ -4328,7 +4438,7 @@
             <a:fld id="{BC74A038-378E-433B-BC31-2F54A84BF403}" type="datetime1">
               <a:rPr lang="en-US"/>
               <a:pPr/>
-              <a:t>29.07.2012</a:t>
+              <a:t>17.07.2013</a:t>
             </a:fld>
             <a:r>
               <a:rPr lang="en-US"/>
@@ -4427,6 +4537,11 @@
         </p:txBody>
       </p:sp>
     </p:spTree>
+    <p:extLst>
+      <p:ext uri="{BB962C8B-B14F-4D97-AF65-F5344CB8AC3E}">
+        <p14:creationId xmlns:p14="http://schemas.microsoft.com/office/powerpoint/2010/main" val="1766298286"/>
+      </p:ext>
+    </p:extLst>
   </p:cSld>
   <p:clrMapOvr>
     <a:masterClrMapping/>
@@ -4496,7 +4611,7 @@
             <a:fld id="{D3BB6F82-EE37-4287-B6B8-E591DF304F95}" type="datetime1">
               <a:rPr lang="en-US"/>
               <a:pPr/>
-              <a:t>29.07.2012</a:t>
+              <a:t>17.07.2013</a:t>
             </a:fld>
             <a:r>
               <a:rPr lang="en-US"/>
@@ -4595,6 +4710,11 @@
         </p:txBody>
       </p:sp>
     </p:spTree>
+    <p:extLst>
+      <p:ext uri="{BB962C8B-B14F-4D97-AF65-F5344CB8AC3E}">
+        <p14:creationId xmlns:p14="http://schemas.microsoft.com/office/powerpoint/2010/main" val="2170296536"/>
+      </p:ext>
+    </p:extLst>
   </p:cSld>
   <p:clrMapOvr>
     <a:masterClrMapping/>
@@ -4664,7 +4784,7 @@
             <a:fld id="{EDB662FF-72A3-4771-9C15-5C50738274B8}" type="datetime1">
               <a:rPr lang="en-US"/>
               <a:pPr/>
-              <a:t>29.07.2012</a:t>
+              <a:t>17.07.2013</a:t>
             </a:fld>
             <a:r>
               <a:rPr lang="en-US"/>
@@ -4763,6 +4883,11 @@
         </p:txBody>
       </p:sp>
     </p:spTree>
+    <p:extLst>
+      <p:ext uri="{BB962C8B-B14F-4D97-AF65-F5344CB8AC3E}">
+        <p14:creationId xmlns:p14="http://schemas.microsoft.com/office/powerpoint/2010/main" val="827905894"/>
+      </p:ext>
+    </p:extLst>
   </p:cSld>
   <p:clrMapOvr>
     <a:masterClrMapping/>
@@ -4832,7 +4957,7 @@
             <a:fld id="{7BCC4945-D2C5-4040-9486-C292FC628965}" type="datetime1">
               <a:rPr lang="en-US"/>
               <a:pPr/>
-              <a:t>29.07.2012</a:t>
+              <a:t>17.07.2013</a:t>
             </a:fld>
             <a:r>
               <a:rPr lang="en-US"/>
@@ -4931,6 +5056,11 @@
         </p:txBody>
       </p:sp>
     </p:spTree>
+    <p:extLst>
+      <p:ext uri="{BB962C8B-B14F-4D97-AF65-F5344CB8AC3E}">
+        <p14:creationId xmlns:p14="http://schemas.microsoft.com/office/powerpoint/2010/main" val="3970826129"/>
+      </p:ext>
+    </p:extLst>
   </p:cSld>
   <p:clrMapOvr>
     <a:masterClrMapping/>
@@ -5000,7 +5130,7 @@
             <a:fld id="{7BCC4945-D2C5-4040-9486-C292FC628965}" type="datetime1">
               <a:rPr lang="en-US"/>
               <a:pPr/>
-              <a:t>29.07.2012</a:t>
+              <a:t>17.07.2013</a:t>
             </a:fld>
             <a:r>
               <a:rPr lang="en-US"/>
@@ -5099,6 +5229,11 @@
         </p:txBody>
       </p:sp>
     </p:spTree>
+    <p:extLst>
+      <p:ext uri="{BB962C8B-B14F-4D97-AF65-F5344CB8AC3E}">
+        <p14:creationId xmlns:p14="http://schemas.microsoft.com/office/powerpoint/2010/main" val="980430702"/>
+      </p:ext>
+    </p:extLst>
   </p:cSld>
   <p:clrMapOvr>
     <a:masterClrMapping/>
@@ -5168,7 +5303,7 @@
             <a:fld id="{AA7B792C-AAA7-49BA-A215-27D20EC14667}" type="datetime1">
               <a:rPr lang="en-US"/>
               <a:pPr/>
-              <a:t>29.07.2012</a:t>
+              <a:t>17.07.2013</a:t>
             </a:fld>
             <a:r>
               <a:rPr lang="en-US"/>
@@ -5267,6 +5402,11 @@
         </p:txBody>
       </p:sp>
     </p:spTree>
+    <p:extLst>
+      <p:ext uri="{BB962C8B-B14F-4D97-AF65-F5344CB8AC3E}">
+        <p14:creationId xmlns:p14="http://schemas.microsoft.com/office/powerpoint/2010/main" val="3282151263"/>
+      </p:ext>
+    </p:extLst>
   </p:cSld>
   <p:clrMapOvr>
     <a:masterClrMapping/>

</xml_diff>